<commit_message>
Added more information about RNN and LSTM
</commit_message>
<xml_diff>
--- a/presentation.pptx
+++ b/presentation.pptx
@@ -4,15 +4,20 @@
   <p:sldMasterIdLst>
     <p:sldMasterId id="2147483648" r:id="rId1"/>
   </p:sldMasterIdLst>
+  <p:notesMasterIdLst>
+    <p:notesMasterId r:id="rId12"/>
+  </p:notesMasterIdLst>
   <p:sldIdLst>
     <p:sldId id="256" r:id="rId2"/>
     <p:sldId id="257" r:id="rId3"/>
-    <p:sldId id="258" r:id="rId4"/>
-    <p:sldId id="259" r:id="rId5"/>
-    <p:sldId id="260" r:id="rId6"/>
-    <p:sldId id="261" r:id="rId7"/>
-    <p:sldId id="262" r:id="rId8"/>
-    <p:sldId id="263" r:id="rId9"/>
+    <p:sldId id="264" r:id="rId4"/>
+    <p:sldId id="265" r:id="rId5"/>
+    <p:sldId id="258" r:id="rId6"/>
+    <p:sldId id="259" r:id="rId7"/>
+    <p:sldId id="260" r:id="rId8"/>
+    <p:sldId id="261" r:id="rId9"/>
+    <p:sldId id="262" r:id="rId10"/>
+    <p:sldId id="263" r:id="rId11"/>
   </p:sldIdLst>
   <p:sldSz cx="12192000" cy="6858000"/>
   <p:notesSz cx="6858000" cy="9144000"/>
@@ -119,6 +124,355 @@
 </p:presentation>
 </file>
 
+<file path=ppt/notesMasters/notesMaster1.xml><?xml version="1.0" encoding="utf-8"?>
+<p:notesMaster xmlns:a="http://schemas.openxmlformats.org/drawingml/2006/main" xmlns:r="http://schemas.openxmlformats.org/officeDocument/2006/relationships" xmlns:p="http://schemas.openxmlformats.org/presentationml/2006/main">
+  <p:cSld>
+    <p:bg>
+      <p:bgRef idx="1001">
+        <a:schemeClr val="bg1"/>
+      </p:bgRef>
+    </p:bg>
+    <p:spTree>
+      <p:nvGrpSpPr>
+        <p:cNvPr id="1" name=""/>
+        <p:cNvGrpSpPr/>
+        <p:nvPr/>
+      </p:nvGrpSpPr>
+      <p:grpSpPr>
+        <a:xfrm>
+          <a:off x="0" y="0"/>
+          <a:ext cx="0" cy="0"/>
+          <a:chOff x="0" y="0"/>
+          <a:chExt cx="0" cy="0"/>
+        </a:xfrm>
+      </p:grpSpPr>
+      <p:sp>
+        <p:nvSpPr>
+          <p:cNvPr id="2" name="Header Placeholder 1"/>
+          <p:cNvSpPr>
+            <a:spLocks noGrp="1"/>
+          </p:cNvSpPr>
+          <p:nvPr>
+            <p:ph type="hdr" sz="quarter"/>
+          </p:nvPr>
+        </p:nvSpPr>
+        <p:spPr>
+          <a:xfrm>
+            <a:off x="0" y="0"/>
+            <a:ext cx="2971800" cy="458788"/>
+          </a:xfrm>
+          <a:prstGeom prst="rect">
+            <a:avLst/>
+          </a:prstGeom>
+        </p:spPr>
+        <p:txBody>
+          <a:bodyPr vert="horz" lIns="91440" tIns="45720" rIns="91440" bIns="45720" rtlCol="0"/>
+          <a:lstStyle>
+            <a:lvl1pPr algn="l">
+              <a:defRPr sz="1200"/>
+            </a:lvl1pPr>
+          </a:lstStyle>
+          <a:p>
+            <a:endParaRPr lang="en-US"/>
+          </a:p>
+        </p:txBody>
+      </p:sp>
+      <p:sp>
+        <p:nvSpPr>
+          <p:cNvPr id="3" name="Date Placeholder 2"/>
+          <p:cNvSpPr>
+            <a:spLocks noGrp="1"/>
+          </p:cNvSpPr>
+          <p:nvPr>
+            <p:ph type="dt" idx="1"/>
+          </p:nvPr>
+        </p:nvSpPr>
+        <p:spPr>
+          <a:xfrm>
+            <a:off x="3884613" y="0"/>
+            <a:ext cx="2971800" cy="458788"/>
+          </a:xfrm>
+          <a:prstGeom prst="rect">
+            <a:avLst/>
+          </a:prstGeom>
+        </p:spPr>
+        <p:txBody>
+          <a:bodyPr vert="horz" lIns="91440" tIns="45720" rIns="91440" bIns="45720" rtlCol="0"/>
+          <a:lstStyle>
+            <a:lvl1pPr algn="r">
+              <a:defRPr sz="1200"/>
+            </a:lvl1pPr>
+          </a:lstStyle>
+          <a:p>
+            <a:fld id="{0FBF1613-C1BE-473A-BE9A-3C99A7C3767C}" type="datetimeFigureOut">
+              <a:rPr lang="en-US" smtClean="0"/>
+              <a:t>4/2/2019</a:t>
+            </a:fld>
+            <a:endParaRPr lang="en-US"/>
+          </a:p>
+        </p:txBody>
+      </p:sp>
+      <p:sp>
+        <p:nvSpPr>
+          <p:cNvPr id="4" name="Slide Image Placeholder 3"/>
+          <p:cNvSpPr>
+            <a:spLocks noGrp="1" noRot="1" noChangeAspect="1"/>
+          </p:cNvSpPr>
+          <p:nvPr>
+            <p:ph type="sldImg" idx="2"/>
+          </p:nvPr>
+        </p:nvSpPr>
+        <p:spPr>
+          <a:xfrm>
+            <a:off x="685800" y="1143000"/>
+            <a:ext cx="5486400" cy="3086100"/>
+          </a:xfrm>
+          <a:prstGeom prst="rect">
+            <a:avLst/>
+          </a:prstGeom>
+          <a:noFill/>
+          <a:ln w="12700">
+            <a:solidFill>
+              <a:prstClr val="black"/>
+            </a:solidFill>
+          </a:ln>
+        </p:spPr>
+        <p:txBody>
+          <a:bodyPr vert="horz" lIns="91440" tIns="45720" rIns="91440" bIns="45720" rtlCol="0" anchor="ctr"/>
+          <a:lstStyle/>
+          <a:p>
+            <a:endParaRPr lang="en-US"/>
+          </a:p>
+        </p:txBody>
+      </p:sp>
+      <p:sp>
+        <p:nvSpPr>
+          <p:cNvPr id="5" name="Notes Placeholder 4"/>
+          <p:cNvSpPr>
+            <a:spLocks noGrp="1"/>
+          </p:cNvSpPr>
+          <p:nvPr>
+            <p:ph type="body" sz="quarter" idx="3"/>
+          </p:nvPr>
+        </p:nvSpPr>
+        <p:spPr>
+          <a:xfrm>
+            <a:off x="685800" y="4400550"/>
+            <a:ext cx="5486400" cy="3600450"/>
+          </a:xfrm>
+          <a:prstGeom prst="rect">
+            <a:avLst/>
+          </a:prstGeom>
+        </p:spPr>
+        <p:txBody>
+          <a:bodyPr vert="horz" lIns="91440" tIns="45720" rIns="91440" bIns="45720" rtlCol="0"/>
+          <a:lstStyle/>
+          <a:p>
+            <a:pPr lvl="0"/>
+            <a:r>
+              <a:rPr lang="en-US"/>
+              <a:t>Click to edit Master text styles</a:t>
+            </a:r>
+          </a:p>
+          <a:p>
+            <a:pPr lvl="1"/>
+            <a:r>
+              <a:rPr lang="en-US"/>
+              <a:t>Second level</a:t>
+            </a:r>
+          </a:p>
+          <a:p>
+            <a:pPr lvl="2"/>
+            <a:r>
+              <a:rPr lang="en-US"/>
+              <a:t>Third level</a:t>
+            </a:r>
+          </a:p>
+          <a:p>
+            <a:pPr lvl="3"/>
+            <a:r>
+              <a:rPr lang="en-US"/>
+              <a:t>Fourth level</a:t>
+            </a:r>
+          </a:p>
+          <a:p>
+            <a:pPr lvl="4"/>
+            <a:r>
+              <a:rPr lang="en-US"/>
+              <a:t>Fifth level</a:t>
+            </a:r>
+          </a:p>
+        </p:txBody>
+      </p:sp>
+      <p:sp>
+        <p:nvSpPr>
+          <p:cNvPr id="6" name="Footer Placeholder 5"/>
+          <p:cNvSpPr>
+            <a:spLocks noGrp="1"/>
+          </p:cNvSpPr>
+          <p:nvPr>
+            <p:ph type="ftr" sz="quarter" idx="4"/>
+          </p:nvPr>
+        </p:nvSpPr>
+        <p:spPr>
+          <a:xfrm>
+            <a:off x="0" y="8685213"/>
+            <a:ext cx="2971800" cy="458787"/>
+          </a:xfrm>
+          <a:prstGeom prst="rect">
+            <a:avLst/>
+          </a:prstGeom>
+        </p:spPr>
+        <p:txBody>
+          <a:bodyPr vert="horz" lIns="91440" tIns="45720" rIns="91440" bIns="45720" rtlCol="0" anchor="b"/>
+          <a:lstStyle>
+            <a:lvl1pPr algn="l">
+              <a:defRPr sz="1200"/>
+            </a:lvl1pPr>
+          </a:lstStyle>
+          <a:p>
+            <a:endParaRPr lang="en-US"/>
+          </a:p>
+        </p:txBody>
+      </p:sp>
+      <p:sp>
+        <p:nvSpPr>
+          <p:cNvPr id="7" name="Slide Number Placeholder 6"/>
+          <p:cNvSpPr>
+            <a:spLocks noGrp="1"/>
+          </p:cNvSpPr>
+          <p:nvPr>
+            <p:ph type="sldNum" sz="quarter" idx="5"/>
+          </p:nvPr>
+        </p:nvSpPr>
+        <p:spPr>
+          <a:xfrm>
+            <a:off x="3884613" y="8685213"/>
+            <a:ext cx="2971800" cy="458787"/>
+          </a:xfrm>
+          <a:prstGeom prst="rect">
+            <a:avLst/>
+          </a:prstGeom>
+        </p:spPr>
+        <p:txBody>
+          <a:bodyPr vert="horz" lIns="91440" tIns="45720" rIns="91440" bIns="45720" rtlCol="0" anchor="b"/>
+          <a:lstStyle>
+            <a:lvl1pPr algn="r">
+              <a:defRPr sz="1200"/>
+            </a:lvl1pPr>
+          </a:lstStyle>
+          <a:p>
+            <a:fld id="{C7149AF3-C225-4A76-9C61-F5A37FFD6108}" type="slidenum">
+              <a:rPr lang="en-US" smtClean="0"/>
+              <a:t>‹#›</a:t>
+            </a:fld>
+            <a:endParaRPr lang="en-US"/>
+          </a:p>
+        </p:txBody>
+      </p:sp>
+    </p:spTree>
+    <p:extLst>
+      <p:ext uri="{BB962C8B-B14F-4D97-AF65-F5344CB8AC3E}">
+        <p14:creationId xmlns:p14="http://schemas.microsoft.com/office/powerpoint/2010/main" val="2305536507"/>
+      </p:ext>
+    </p:extLst>
+  </p:cSld>
+  <p:clrMap bg1="lt1" tx1="dk1" bg2="lt2" tx2="dk2" accent1="accent1" accent2="accent2" accent3="accent3" accent4="accent4" accent5="accent5" accent6="accent6" hlink="hlink" folHlink="folHlink"/>
+  <p:notesStyle>
+    <a:lvl1pPr marL="0" algn="l" defTabSz="914400" rtl="0" eaLnBrk="1" latinLnBrk="0" hangingPunct="1">
+      <a:defRPr sz="1200" kern="1200">
+        <a:solidFill>
+          <a:schemeClr val="tx1"/>
+        </a:solidFill>
+        <a:latin typeface="+mn-lt"/>
+        <a:ea typeface="+mn-ea"/>
+        <a:cs typeface="+mn-cs"/>
+      </a:defRPr>
+    </a:lvl1pPr>
+    <a:lvl2pPr marL="457200" algn="l" defTabSz="914400" rtl="0" eaLnBrk="1" latinLnBrk="0" hangingPunct="1">
+      <a:defRPr sz="1200" kern="1200">
+        <a:solidFill>
+          <a:schemeClr val="tx1"/>
+        </a:solidFill>
+        <a:latin typeface="+mn-lt"/>
+        <a:ea typeface="+mn-ea"/>
+        <a:cs typeface="+mn-cs"/>
+      </a:defRPr>
+    </a:lvl2pPr>
+    <a:lvl3pPr marL="914400" algn="l" defTabSz="914400" rtl="0" eaLnBrk="1" latinLnBrk="0" hangingPunct="1">
+      <a:defRPr sz="1200" kern="1200">
+        <a:solidFill>
+          <a:schemeClr val="tx1"/>
+        </a:solidFill>
+        <a:latin typeface="+mn-lt"/>
+        <a:ea typeface="+mn-ea"/>
+        <a:cs typeface="+mn-cs"/>
+      </a:defRPr>
+    </a:lvl3pPr>
+    <a:lvl4pPr marL="1371600" algn="l" defTabSz="914400" rtl="0" eaLnBrk="1" latinLnBrk="0" hangingPunct="1">
+      <a:defRPr sz="1200" kern="1200">
+        <a:solidFill>
+          <a:schemeClr val="tx1"/>
+        </a:solidFill>
+        <a:latin typeface="+mn-lt"/>
+        <a:ea typeface="+mn-ea"/>
+        <a:cs typeface="+mn-cs"/>
+      </a:defRPr>
+    </a:lvl4pPr>
+    <a:lvl5pPr marL="1828800" algn="l" defTabSz="914400" rtl="0" eaLnBrk="1" latinLnBrk="0" hangingPunct="1">
+      <a:defRPr sz="1200" kern="1200">
+        <a:solidFill>
+          <a:schemeClr val="tx1"/>
+        </a:solidFill>
+        <a:latin typeface="+mn-lt"/>
+        <a:ea typeface="+mn-ea"/>
+        <a:cs typeface="+mn-cs"/>
+      </a:defRPr>
+    </a:lvl5pPr>
+    <a:lvl6pPr marL="2286000" algn="l" defTabSz="914400" rtl="0" eaLnBrk="1" latinLnBrk="0" hangingPunct="1">
+      <a:defRPr sz="1200" kern="1200">
+        <a:solidFill>
+          <a:schemeClr val="tx1"/>
+        </a:solidFill>
+        <a:latin typeface="+mn-lt"/>
+        <a:ea typeface="+mn-ea"/>
+        <a:cs typeface="+mn-cs"/>
+      </a:defRPr>
+    </a:lvl6pPr>
+    <a:lvl7pPr marL="2743200" algn="l" defTabSz="914400" rtl="0" eaLnBrk="1" latinLnBrk="0" hangingPunct="1">
+      <a:defRPr sz="1200" kern="1200">
+        <a:solidFill>
+          <a:schemeClr val="tx1"/>
+        </a:solidFill>
+        <a:latin typeface="+mn-lt"/>
+        <a:ea typeface="+mn-ea"/>
+        <a:cs typeface="+mn-cs"/>
+      </a:defRPr>
+    </a:lvl7pPr>
+    <a:lvl8pPr marL="3200400" algn="l" defTabSz="914400" rtl="0" eaLnBrk="1" latinLnBrk="0" hangingPunct="1">
+      <a:defRPr sz="1200" kern="1200">
+        <a:solidFill>
+          <a:schemeClr val="tx1"/>
+        </a:solidFill>
+        <a:latin typeface="+mn-lt"/>
+        <a:ea typeface="+mn-ea"/>
+        <a:cs typeface="+mn-cs"/>
+      </a:defRPr>
+    </a:lvl8pPr>
+    <a:lvl9pPr marL="3657600" algn="l" defTabSz="914400" rtl="0" eaLnBrk="1" latinLnBrk="0" hangingPunct="1">
+      <a:defRPr sz="1200" kern="1200">
+        <a:solidFill>
+          <a:schemeClr val="tx1"/>
+        </a:solidFill>
+        <a:latin typeface="+mn-lt"/>
+        <a:ea typeface="+mn-ea"/>
+        <a:cs typeface="+mn-cs"/>
+      </a:defRPr>
+    </a:lvl9pPr>
+  </p:notesStyle>
+</p:notesMaster>
+</file>
+
 <file path=ppt/slideLayouts/slideLayout1.xml><?xml version="1.0" encoding="utf-8"?>
 <p:sldLayout xmlns:a="http://schemas.openxmlformats.org/drawingml/2006/main" xmlns:r="http://schemas.openxmlformats.org/officeDocument/2006/relationships" xmlns:p="http://schemas.openxmlformats.org/presentationml/2006/main" type="title" preserve="1">
   <p:cSld name="Title Slide">
@@ -264,9 +618,9 @@
           <a:bodyPr/>
           <a:lstStyle/>
           <a:p>
-            <a:fld id="{A8B554AD-3814-4BA3-A3BB-9CD1B3034BEE}" type="datetimeFigureOut">
+            <a:fld id="{C021FA39-F097-4B3B-B66F-9CA94FEEBB52}" type="datetime1">
               <a:rPr lang="en-US" smtClean="0"/>
-              <a:t>4/1/2019</a:t>
+              <a:t>4/2/2019</a:t>
             </a:fld>
             <a:endParaRPr lang="en-US"/>
           </a:p>
@@ -462,9 +816,9 @@
           <a:bodyPr/>
           <a:lstStyle/>
           <a:p>
-            <a:fld id="{A8B554AD-3814-4BA3-A3BB-9CD1B3034BEE}" type="datetimeFigureOut">
+            <a:fld id="{528EE7DC-887F-4708-8496-BE3703FE5280}" type="datetime1">
               <a:rPr lang="en-US" smtClean="0"/>
-              <a:t>4/1/2019</a:t>
+              <a:t>4/2/2019</a:t>
             </a:fld>
             <a:endParaRPr lang="en-US"/>
           </a:p>
@@ -670,9 +1024,9 @@
           <a:bodyPr/>
           <a:lstStyle/>
           <a:p>
-            <a:fld id="{A8B554AD-3814-4BA3-A3BB-9CD1B3034BEE}" type="datetimeFigureOut">
+            <a:fld id="{882C2A52-6082-43D9-A840-A7B1A2E27CF8}" type="datetime1">
               <a:rPr lang="en-US" smtClean="0"/>
-              <a:t>4/1/2019</a:t>
+              <a:t>4/2/2019</a:t>
             </a:fld>
             <a:endParaRPr lang="en-US"/>
           </a:p>
@@ -868,9 +1222,9 @@
           <a:bodyPr/>
           <a:lstStyle/>
           <a:p>
-            <a:fld id="{A8B554AD-3814-4BA3-A3BB-9CD1B3034BEE}" type="datetimeFigureOut">
+            <a:fld id="{110337BB-B65E-4CC5-A9C2-68FB1B8D2FDE}" type="datetime1">
               <a:rPr lang="en-US" smtClean="0"/>
-              <a:t>4/1/2019</a:t>
+              <a:t>4/2/2019</a:t>
             </a:fld>
             <a:endParaRPr lang="en-US"/>
           </a:p>
@@ -1143,9 +1497,9 @@
           <a:bodyPr/>
           <a:lstStyle/>
           <a:p>
-            <a:fld id="{A8B554AD-3814-4BA3-A3BB-9CD1B3034BEE}" type="datetimeFigureOut">
+            <a:fld id="{273BC3D2-C74C-4400-A913-AF612898D31B}" type="datetime1">
               <a:rPr lang="en-US" smtClean="0"/>
-              <a:t>4/1/2019</a:t>
+              <a:t>4/2/2019</a:t>
             </a:fld>
             <a:endParaRPr lang="en-US"/>
           </a:p>
@@ -1408,9 +1762,9 @@
           <a:bodyPr/>
           <a:lstStyle/>
           <a:p>
-            <a:fld id="{A8B554AD-3814-4BA3-A3BB-9CD1B3034BEE}" type="datetimeFigureOut">
+            <a:fld id="{E7FD3C5F-2C9A-4006-924A-0D3C5CB273C5}" type="datetime1">
               <a:rPr lang="en-US" smtClean="0"/>
-              <a:t>4/1/2019</a:t>
+              <a:t>4/2/2019</a:t>
             </a:fld>
             <a:endParaRPr lang="en-US"/>
           </a:p>
@@ -1820,9 +2174,9 @@
           <a:bodyPr/>
           <a:lstStyle/>
           <a:p>
-            <a:fld id="{A8B554AD-3814-4BA3-A3BB-9CD1B3034BEE}" type="datetimeFigureOut">
+            <a:fld id="{6E058A4D-049F-48B8-81A5-3B79436C91D8}" type="datetime1">
               <a:rPr lang="en-US" smtClean="0"/>
-              <a:t>4/1/2019</a:t>
+              <a:t>4/2/2019</a:t>
             </a:fld>
             <a:endParaRPr lang="en-US"/>
           </a:p>
@@ -1961,9 +2315,9 @@
           <a:bodyPr/>
           <a:lstStyle/>
           <a:p>
-            <a:fld id="{A8B554AD-3814-4BA3-A3BB-9CD1B3034BEE}" type="datetimeFigureOut">
+            <a:fld id="{B3527706-B7D5-48E6-B99F-8409B68CF433}" type="datetime1">
               <a:rPr lang="en-US" smtClean="0"/>
-              <a:t>4/1/2019</a:t>
+              <a:t>4/2/2019</a:t>
             </a:fld>
             <a:endParaRPr lang="en-US"/>
           </a:p>
@@ -2074,9 +2428,9 @@
           <a:bodyPr/>
           <a:lstStyle/>
           <a:p>
-            <a:fld id="{A8B554AD-3814-4BA3-A3BB-9CD1B3034BEE}" type="datetimeFigureOut">
+            <a:fld id="{8D82161C-0067-4486-B127-038BDAEFB232}" type="datetime1">
               <a:rPr lang="en-US" smtClean="0"/>
-              <a:t>4/1/2019</a:t>
+              <a:t>4/2/2019</a:t>
             </a:fld>
             <a:endParaRPr lang="en-US"/>
           </a:p>
@@ -2385,9 +2739,9 @@
           <a:bodyPr/>
           <a:lstStyle/>
           <a:p>
-            <a:fld id="{A8B554AD-3814-4BA3-A3BB-9CD1B3034BEE}" type="datetimeFigureOut">
+            <a:fld id="{465679BF-4D8C-4939-BFB1-3BF6E3C8B378}" type="datetime1">
               <a:rPr lang="en-US" smtClean="0"/>
-              <a:t>4/1/2019</a:t>
+              <a:t>4/2/2019</a:t>
             </a:fld>
             <a:endParaRPr lang="en-US"/>
           </a:p>
@@ -2673,9 +3027,9 @@
           <a:bodyPr/>
           <a:lstStyle/>
           <a:p>
-            <a:fld id="{A8B554AD-3814-4BA3-A3BB-9CD1B3034BEE}" type="datetimeFigureOut">
+            <a:fld id="{7822473D-DDE1-4CEC-BD6B-6927A54070C8}" type="datetime1">
               <a:rPr lang="en-US" smtClean="0"/>
-              <a:t>4/1/2019</a:t>
+              <a:t>4/2/2019</a:t>
             </a:fld>
             <a:endParaRPr lang="en-US"/>
           </a:p>
@@ -2914,9 +3268,9 @@
             </a:lvl1pPr>
           </a:lstStyle>
           <a:p>
-            <a:fld id="{A8B554AD-3814-4BA3-A3BB-9CD1B3034BEE}" type="datetimeFigureOut">
+            <a:fld id="{E132BAF6-276D-426F-A07B-3585C9531CAD}" type="datetime1">
               <a:rPr lang="en-US" smtClean="0"/>
-              <a:t>4/1/2019</a:t>
+              <a:t>4/2/2019</a:t>
             </a:fld>
             <a:endParaRPr lang="en-US"/>
           </a:p>
@@ -3033,6 +3387,7 @@
     <p:sldLayoutId id="2147483658" r:id="rId10"/>
     <p:sldLayoutId id="2147483659" r:id="rId11"/>
   </p:sldLayoutIdLst>
+  <p:hf hdr="0" ftr="0" dt="0"/>
   <p:txStyles>
     <p:titleStyle>
       <a:lvl1pPr algn="l" defTabSz="914400" rtl="0" eaLnBrk="1" latinLnBrk="0" hangingPunct="1">
@@ -3399,10 +3754,193 @@
           </a:p>
         </p:txBody>
       </p:sp>
+      <p:sp>
+        <p:nvSpPr>
+          <p:cNvPr id="4" name="Slide Number Placeholder 3">
+            <a:extLst>
+              <a:ext uri="{FF2B5EF4-FFF2-40B4-BE49-F238E27FC236}">
+                <a16:creationId xmlns:a16="http://schemas.microsoft.com/office/drawing/2014/main" id="{36902D45-8422-4737-A046-74EC52C21C8A}"/>
+              </a:ext>
+            </a:extLst>
+          </p:cNvPr>
+          <p:cNvSpPr>
+            <a:spLocks noGrp="1"/>
+          </p:cNvSpPr>
+          <p:nvPr>
+            <p:ph type="sldNum" sz="quarter" idx="12"/>
+          </p:nvPr>
+        </p:nvSpPr>
+        <p:spPr/>
+        <p:txBody>
+          <a:bodyPr/>
+          <a:lstStyle/>
+          <a:p>
+            <a:fld id="{5CD4DF6E-3AFD-46C7-AD8A-B62CB1DA2890}" type="slidenum">
+              <a:rPr lang="en-US" smtClean="0"/>
+              <a:t>1</a:t>
+            </a:fld>
+            <a:endParaRPr lang="en-US"/>
+          </a:p>
+        </p:txBody>
+      </p:sp>
     </p:spTree>
     <p:extLst>
       <p:ext uri="{BB962C8B-B14F-4D97-AF65-F5344CB8AC3E}">
         <p14:creationId xmlns:p14="http://schemas.microsoft.com/office/powerpoint/2010/main" val="1614544691"/>
+      </p:ext>
+    </p:extLst>
+  </p:cSld>
+  <p:clrMapOvr>
+    <a:masterClrMapping/>
+  </p:clrMapOvr>
+</p:sld>
+</file>
+
+<file path=ppt/slides/slide10.xml><?xml version="1.0" encoding="utf-8"?>
+<p:sld xmlns:a="http://schemas.openxmlformats.org/drawingml/2006/main" xmlns:r="http://schemas.openxmlformats.org/officeDocument/2006/relationships" xmlns:p="http://schemas.openxmlformats.org/presentationml/2006/main">
+  <p:cSld>
+    <p:spTree>
+      <p:nvGrpSpPr>
+        <p:cNvPr id="1" name=""/>
+        <p:cNvGrpSpPr/>
+        <p:nvPr/>
+      </p:nvGrpSpPr>
+      <p:grpSpPr>
+        <a:xfrm>
+          <a:off x="0" y="0"/>
+          <a:ext cx="0" cy="0"/>
+          <a:chOff x="0" y="0"/>
+          <a:chExt cx="0" cy="0"/>
+        </a:xfrm>
+      </p:grpSpPr>
+      <p:sp>
+        <p:nvSpPr>
+          <p:cNvPr id="2" name="Title 1">
+            <a:extLst>
+              <a:ext uri="{FF2B5EF4-FFF2-40B4-BE49-F238E27FC236}">
+                <a16:creationId xmlns:a16="http://schemas.microsoft.com/office/drawing/2014/main" id="{B1A96B1E-6167-4EF5-B7A2-EF942F67CDEF}"/>
+              </a:ext>
+            </a:extLst>
+          </p:cNvPr>
+          <p:cNvSpPr>
+            <a:spLocks noGrp="1"/>
+          </p:cNvSpPr>
+          <p:nvPr>
+            <p:ph type="title"/>
+          </p:nvPr>
+        </p:nvSpPr>
+        <p:spPr/>
+        <p:txBody>
+          <a:bodyPr/>
+          <a:lstStyle/>
+          <a:p>
+            <a:r>
+              <a:rPr lang="en-US" dirty="0"/>
+              <a:t>Resources</a:t>
+            </a:r>
+          </a:p>
+        </p:txBody>
+      </p:sp>
+      <p:sp>
+        <p:nvSpPr>
+          <p:cNvPr id="3" name="Content Placeholder 2">
+            <a:extLst>
+              <a:ext uri="{FF2B5EF4-FFF2-40B4-BE49-F238E27FC236}">
+                <a16:creationId xmlns:a16="http://schemas.microsoft.com/office/drawing/2014/main" id="{E2E023F1-D434-4328-90D1-6E0E6F443958}"/>
+              </a:ext>
+            </a:extLst>
+          </p:cNvPr>
+          <p:cNvSpPr>
+            <a:spLocks noGrp="1"/>
+          </p:cNvSpPr>
+          <p:nvPr>
+            <p:ph idx="1"/>
+          </p:nvPr>
+        </p:nvSpPr>
+        <p:spPr/>
+        <p:txBody>
+          <a:bodyPr/>
+          <a:lstStyle/>
+          <a:p>
+            <a:r>
+              <a:rPr lang="en-US" dirty="0">
+                <a:hlinkClick r:id="rId2"/>
+              </a:rPr>
+              <a:t>https://people.xiph.org/~jm/demo/rnnoise/</a:t>
+            </a:r>
+            <a:endParaRPr lang="en-US" dirty="0"/>
+          </a:p>
+          <a:p>
+            <a:r>
+              <a:rPr lang="en-US" dirty="0">
+                <a:hlinkClick r:id="rId3"/>
+              </a:rPr>
+              <a:t>https://hacks.mozilla.org/2017/09/rnnoise-deep-learning-noise-suppression/</a:t>
+            </a:r>
+            <a:endParaRPr lang="en-US" dirty="0"/>
+          </a:p>
+          <a:p>
+            <a:r>
+              <a:rPr lang="en-US" dirty="0">
+                <a:hlinkClick r:id="rId4"/>
+              </a:rPr>
+              <a:t>https://en.wikipedia.org/wiki/Recurrent_neural_network</a:t>
+            </a:r>
+            <a:endParaRPr lang="en-US" dirty="0"/>
+          </a:p>
+          <a:p>
+            <a:r>
+              <a:rPr lang="en-US" dirty="0">
+                <a:hlinkClick r:id="rId5"/>
+              </a:rPr>
+              <a:t>https://towardsdatascience.com/recurrent-neural-networks-and-lstm-4b601dd822a5</a:t>
+            </a:r>
+            <a:endParaRPr lang="en-US" dirty="0"/>
+          </a:p>
+          <a:p>
+            <a:r>
+              <a:rPr lang="en-US" dirty="0">
+                <a:hlinkClick r:id="rId6"/>
+              </a:rPr>
+              <a:t>https://en.wikipedia.org/wiki/Long_short-term_memory</a:t>
+            </a:r>
+            <a:endParaRPr lang="en-US" dirty="0"/>
+          </a:p>
+        </p:txBody>
+      </p:sp>
+      <p:sp>
+        <p:nvSpPr>
+          <p:cNvPr id="4" name="Slide Number Placeholder 3">
+            <a:extLst>
+              <a:ext uri="{FF2B5EF4-FFF2-40B4-BE49-F238E27FC236}">
+                <a16:creationId xmlns:a16="http://schemas.microsoft.com/office/drawing/2014/main" id="{19C1530A-989A-4FB2-82EF-F6CCA2A5431C}"/>
+              </a:ext>
+            </a:extLst>
+          </p:cNvPr>
+          <p:cNvSpPr>
+            <a:spLocks noGrp="1"/>
+          </p:cNvSpPr>
+          <p:nvPr>
+            <p:ph type="sldNum" sz="quarter" idx="12"/>
+          </p:nvPr>
+        </p:nvSpPr>
+        <p:spPr/>
+        <p:txBody>
+          <a:bodyPr/>
+          <a:lstStyle/>
+          <a:p>
+            <a:fld id="{5CD4DF6E-3AFD-46C7-AD8A-B62CB1DA2890}" type="slidenum">
+              <a:rPr lang="en-US" smtClean="0"/>
+              <a:t>10</a:t>
+            </a:fld>
+            <a:endParaRPr lang="en-US"/>
+          </a:p>
+        </p:txBody>
+      </p:sp>
+    </p:spTree>
+    <p:extLst>
+      <p:ext uri="{BB962C8B-B14F-4D97-AF65-F5344CB8AC3E}">
+        <p14:creationId xmlns:p14="http://schemas.microsoft.com/office/powerpoint/2010/main" val="572103786"/>
       </p:ext>
     </p:extLst>
   </p:cSld>
@@ -3486,7 +4024,7 @@
           <a:p>
             <a:r>
               <a:rPr lang="en-US" dirty="0"/>
-              <a:t>Other traditional noise suppression algorithms already exist, with mediocre results</a:t>
+              <a:t>Other traditional noise suppression algorithms already exist, with decent results</a:t>
             </a:r>
           </a:p>
           <a:p>
@@ -3520,8 +4058,37 @@
             <a:pPr lvl="1"/>
             <a:r>
               <a:rPr lang="en-US" dirty="0"/>
-              <a:t>With recurrent neural networks (RNNs) and classic signal processing techniques</a:t>
-            </a:r>
+              <a:t>With recurrent neural networks (RNNs)</a:t>
+            </a:r>
+          </a:p>
+        </p:txBody>
+      </p:sp>
+      <p:sp>
+        <p:nvSpPr>
+          <p:cNvPr id="4" name="Slide Number Placeholder 3">
+            <a:extLst>
+              <a:ext uri="{FF2B5EF4-FFF2-40B4-BE49-F238E27FC236}">
+                <a16:creationId xmlns:a16="http://schemas.microsoft.com/office/drawing/2014/main" id="{85D6A372-570D-49CF-8DD2-3D10356CDD33}"/>
+              </a:ext>
+            </a:extLst>
+          </p:cNvPr>
+          <p:cNvSpPr>
+            <a:spLocks noGrp="1"/>
+          </p:cNvSpPr>
+          <p:nvPr>
+            <p:ph type="sldNum" sz="quarter" idx="12"/>
+          </p:nvPr>
+        </p:nvSpPr>
+        <p:spPr/>
+        <p:txBody>
+          <a:bodyPr/>
+          <a:lstStyle/>
+          <a:p>
+            <a:fld id="{5CD4DF6E-3AFD-46C7-AD8A-B62CB1DA2890}" type="slidenum">
+              <a:rPr lang="en-US" smtClean="0"/>
+              <a:t>2</a:t>
+            </a:fld>
+            <a:endParaRPr lang="en-US"/>
           </a:p>
         </p:txBody>
       </p:sp>
@@ -3541,6 +4108,14 @@
 <file path=ppt/slides/slide3.xml><?xml version="1.0" encoding="utf-8"?>
 <p:sld xmlns:a="http://schemas.openxmlformats.org/drawingml/2006/main" xmlns:r="http://schemas.openxmlformats.org/officeDocument/2006/relationships" xmlns:p="http://schemas.openxmlformats.org/presentationml/2006/main">
   <p:cSld>
+    <p:bg>
+      <p:bgPr>
+        <a:solidFill>
+          <a:schemeClr val="bg1"/>
+        </a:solidFill>
+        <a:effectLst/>
+      </p:bgPr>
+    </p:bg>
     <p:spTree>
       <p:nvGrpSpPr>
         <p:cNvPr id="1" name=""/>
@@ -3560,7 +4135,7 @@
           <p:cNvPr id="2" name="Title 1">
             <a:extLst>
               <a:ext uri="{FF2B5EF4-FFF2-40B4-BE49-F238E27FC236}">
-                <a16:creationId xmlns:a16="http://schemas.microsoft.com/office/drawing/2014/main" id="{8F2D1812-ED00-477B-BE25-E90BF6B2C823}"/>
+                <a16:creationId xmlns:a16="http://schemas.microsoft.com/office/drawing/2014/main" id="{BB37EAEF-F043-4EED-B34F-CED66447EB0C}"/>
               </a:ext>
             </a:extLst>
           </p:cNvPr>
@@ -3571,14 +4146,21 @@
             <p:ph type="title"/>
           </p:nvPr>
         </p:nvSpPr>
-        <p:spPr/>
-        <p:txBody>
-          <a:bodyPr/>
+        <p:spPr>
+          <a:xfrm>
+            <a:off x="838200" y="365125"/>
+            <a:ext cx="10515600" cy="1325563"/>
+          </a:xfrm>
+        </p:spPr>
+        <p:txBody>
+          <a:bodyPr>
+            <a:normAutofit/>
+          </a:bodyPr>
           <a:lstStyle/>
           <a:p>
             <a:r>
               <a:rPr lang="en-US" dirty="0"/>
-              <a:t>Advantages of RNNs</a:t>
+              <a:t>Recurrent Neural Networks (RNNs)</a:t>
             </a:r>
           </a:p>
         </p:txBody>
@@ -3588,7 +4170,7 @@
           <p:cNvPr id="3" name="Content Placeholder 2">
             <a:extLst>
               <a:ext uri="{FF2B5EF4-FFF2-40B4-BE49-F238E27FC236}">
-                <a16:creationId xmlns:a16="http://schemas.microsoft.com/office/drawing/2014/main" id="{665BD318-427F-4538-B84D-733AC5FA9537}"/>
+                <a16:creationId xmlns:a16="http://schemas.microsoft.com/office/drawing/2014/main" id="{F8D1C13B-4379-4855-8726-C4612FF5691C}"/>
               </a:ext>
             </a:extLst>
           </p:cNvPr>
@@ -3599,144 +4181,96 @@
             <p:ph idx="1"/>
           </p:nvPr>
         </p:nvSpPr>
-        <p:spPr/>
-        <p:txBody>
-          <a:bodyPr/>
-          <a:lstStyle/>
-          <a:p>
+        <p:spPr>
+          <a:xfrm>
+            <a:off x="838200" y="1825625"/>
+            <a:ext cx="3797807" cy="4351338"/>
+          </a:xfrm>
+        </p:spPr>
+        <p:txBody>
+          <a:bodyPr>
+            <a:normAutofit lnSpcReduction="10000"/>
+          </a:bodyPr>
+          <a:lstStyle/>
+          <a:p>
+            <a:r>
+              <a:rPr lang="en-US" sz="2400" dirty="0"/>
+              <a:t>Traditional feedforward neural networks output a linear combination of current inputs</a:t>
+            </a:r>
+          </a:p>
+          <a:p>
+            <a:r>
+              <a:rPr lang="en-US" sz="2400" dirty="0"/>
+              <a:t>Recurrent neural networks simply introduce an internal state at each node</a:t>
+            </a:r>
+          </a:p>
+          <a:p>
+            <a:r>
+              <a:rPr lang="en-US" sz="2400" dirty="0"/>
+              <a:t>Recurrent neural networks output combinations of current and past inputs</a:t>
+            </a:r>
+          </a:p>
+          <a:p>
+            <a:pPr lvl="1"/>
             <a:r>
               <a:rPr lang="en-US" dirty="0"/>
-              <a:t>RNNs can dynamically adapt to various types of noise</a:t>
-            </a:r>
-          </a:p>
-          <a:p>
-            <a:pPr lvl="1"/>
-            <a:r>
-              <a:rPr lang="en-US" dirty="0"/>
-              <a:t>RNNs model temporal sequences</a:t>
-            </a:r>
-          </a:p>
-          <a:p>
-            <a:r>
-              <a:rPr lang="en-US" dirty="0"/>
-              <a:t>Hardware requirements are extremely low and processing time is extremely short</a:t>
-            </a:r>
-          </a:p>
-          <a:p>
-            <a:pPr lvl="1"/>
-            <a:r>
-              <a:rPr lang="en-US" dirty="0"/>
-              <a:t>60x faster than real-time on an x86 CPU</a:t>
-            </a:r>
-          </a:p>
-          <a:p>
-            <a:pPr lvl="1"/>
-            <a:r>
-              <a:rPr lang="en-US" dirty="0"/>
-              <a:t>7x faster than real-time on a Raspberry Pi</a:t>
-            </a:r>
-          </a:p>
-          <a:p>
-            <a:pPr lvl="1"/>
-            <a:r>
-              <a:rPr lang="en-US" dirty="0"/>
-              <a:t>Can even be implemented in JavaScript and executed in your browser</a:t>
-            </a:r>
-          </a:p>
-        </p:txBody>
-      </p:sp>
-    </p:spTree>
-    <p:extLst>
-      <p:ext uri="{BB962C8B-B14F-4D97-AF65-F5344CB8AC3E}">
-        <p14:creationId xmlns:p14="http://schemas.microsoft.com/office/powerpoint/2010/main" val="2188919131"/>
-      </p:ext>
-    </p:extLst>
-  </p:cSld>
-  <p:clrMapOvr>
-    <a:masterClrMapping/>
-  </p:clrMapOvr>
-</p:sld>
-</file>
-
-<file path=ppt/slides/slide4.xml><?xml version="1.0" encoding="utf-8"?>
-<p:sld xmlns:a="http://schemas.openxmlformats.org/drawingml/2006/main" xmlns:r="http://schemas.openxmlformats.org/officeDocument/2006/relationships" xmlns:p="http://schemas.openxmlformats.org/presentationml/2006/main">
-  <p:cSld>
-    <p:spTree>
-      <p:nvGrpSpPr>
-        <p:cNvPr id="1" name=""/>
-        <p:cNvGrpSpPr/>
-        <p:nvPr/>
-      </p:nvGrpSpPr>
-      <p:grpSpPr>
-        <a:xfrm>
-          <a:off x="0" y="0"/>
-          <a:ext cx="0" cy="0"/>
-          <a:chOff x="0" y="0"/>
-          <a:chExt cx="0" cy="0"/>
-        </a:xfrm>
-      </p:grpSpPr>
-      <p:sp>
-        <p:nvSpPr>
-          <p:cNvPr id="2" name="Title 1">
-            <a:extLst>
-              <a:ext uri="{FF2B5EF4-FFF2-40B4-BE49-F238E27FC236}">
-                <a16:creationId xmlns:a16="http://schemas.microsoft.com/office/drawing/2014/main" id="{31938827-1503-42E7-BD6C-5A9006C9D0F0}"/>
-              </a:ext>
-            </a:extLst>
-          </p:cNvPr>
-          <p:cNvSpPr>
-            <a:spLocks noGrp="1"/>
-          </p:cNvSpPr>
-          <p:nvPr>
-            <p:ph type="title"/>
-          </p:nvPr>
-        </p:nvSpPr>
-        <p:spPr/>
-        <p:txBody>
-          <a:bodyPr/>
-          <a:lstStyle/>
-          <a:p>
-            <a:r>
-              <a:rPr lang="en-US" dirty="0"/>
-              <a:t>How It Works</a:t>
-            </a:r>
-          </a:p>
-        </p:txBody>
-      </p:sp>
-      <p:sp>
-        <p:nvSpPr>
-          <p:cNvPr id="4" name="Content Placeholder 3">
-            <a:extLst>
-              <a:ext uri="{FF2B5EF4-FFF2-40B4-BE49-F238E27FC236}">
-                <a16:creationId xmlns:a16="http://schemas.microsoft.com/office/drawing/2014/main" id="{1E7AFC40-F86C-4C2B-B4DA-565282468C6A}"/>
-              </a:ext>
-            </a:extLst>
-          </p:cNvPr>
-          <p:cNvSpPr>
-            <a:spLocks noGrp="1"/>
-          </p:cNvSpPr>
-          <p:nvPr>
-            <p:ph idx="1"/>
-          </p:nvPr>
-        </p:nvSpPr>
-        <p:spPr/>
-        <p:txBody>
-          <a:bodyPr/>
-          <a:lstStyle/>
-          <a:p>
-            <a:r>
-              <a:rPr lang="en-US" dirty="0"/>
-              <a:t>RNN determines what part of audio should be removed</a:t>
-            </a:r>
+              <a:t>Very short-term memory</a:t>
+            </a:r>
+          </a:p>
+        </p:txBody>
+      </p:sp>
+      <p:sp>
+        <p:nvSpPr>
+          <p:cNvPr id="4" name="Slide Number Placeholder 3">
+            <a:extLst>
+              <a:ext uri="{FF2B5EF4-FFF2-40B4-BE49-F238E27FC236}">
+                <a16:creationId xmlns:a16="http://schemas.microsoft.com/office/drawing/2014/main" id="{2F5BC21C-AE43-48DF-AF7E-17A4EE852195}"/>
+              </a:ext>
+            </a:extLst>
+          </p:cNvPr>
+          <p:cNvSpPr>
+            <a:spLocks noGrp="1"/>
+          </p:cNvSpPr>
+          <p:nvPr>
+            <p:ph type="sldNum" sz="quarter" idx="12"/>
+          </p:nvPr>
+        </p:nvSpPr>
+        <p:spPr>
+          <a:xfrm>
+            <a:off x="8610600" y="6356350"/>
+            <a:ext cx="2743200" cy="365125"/>
+          </a:xfrm>
+        </p:spPr>
+        <p:txBody>
+          <a:bodyPr>
+            <a:normAutofit/>
+          </a:bodyPr>
+          <a:lstStyle/>
+          <a:p>
+            <a:pPr>
+              <a:spcAft>
+                <a:spcPts val="600"/>
+              </a:spcAft>
+            </a:pPr>
+            <a:fld id="{5CD4DF6E-3AFD-46C7-AD8A-B62CB1DA2890}" type="slidenum">
+              <a:rPr lang="en-US" smtClean="0"/>
+              <a:pPr>
+                <a:spcAft>
+                  <a:spcPts val="600"/>
+                </a:spcAft>
+              </a:pPr>
+              <a:t>3</a:t>
+            </a:fld>
+            <a:endParaRPr lang="en-US"/>
           </a:p>
         </p:txBody>
       </p:sp>
       <p:pic>
         <p:nvPicPr>
-          <p:cNvPr id="6" name="Picture 2" descr="traditional noise suppression">
-            <a:extLst>
-              <a:ext uri="{FF2B5EF4-FFF2-40B4-BE49-F238E27FC236}">
-                <a16:creationId xmlns:a16="http://schemas.microsoft.com/office/drawing/2014/main" id="{CAEBD616-67DE-4359-AAA8-045288A7E7B0}"/>
+          <p:cNvPr id="1030" name="Picture 6" descr="https://cdn-images-1.medium.com/max/1800/0*mRHhGAbsKaJPbT21.png">
+            <a:extLst>
+              <a:ext uri="{FF2B5EF4-FFF2-40B4-BE49-F238E27FC236}">
+                <a16:creationId xmlns:a16="http://schemas.microsoft.com/office/drawing/2014/main" id="{957BAC27-FB36-4E4D-81D0-FEA266DEA61B}"/>
               </a:ext>
             </a:extLst>
           </p:cNvPr>
@@ -3760,8 +4294,8 @@
         </p:blipFill>
         <p:spPr bwMode="auto">
           <a:xfrm>
-            <a:off x="3198072" y="2507469"/>
-            <a:ext cx="5795856" cy="3669494"/>
+            <a:off x="4717030" y="1690688"/>
+            <a:ext cx="7189750" cy="3970277"/>
           </a:xfrm>
           <a:prstGeom prst="rect">
             <a:avLst/>
@@ -3781,7 +4315,218 @@
     </p:spTree>
     <p:extLst>
       <p:ext uri="{BB962C8B-B14F-4D97-AF65-F5344CB8AC3E}">
-        <p14:creationId xmlns:p14="http://schemas.microsoft.com/office/powerpoint/2010/main" val="1288499024"/>
+        <p14:creationId xmlns:p14="http://schemas.microsoft.com/office/powerpoint/2010/main" val="2469610281"/>
+      </p:ext>
+    </p:extLst>
+  </p:cSld>
+  <p:clrMapOvr>
+    <a:masterClrMapping/>
+  </p:clrMapOvr>
+</p:sld>
+</file>
+
+<file path=ppt/slides/slide4.xml><?xml version="1.0" encoding="utf-8"?>
+<p:sld xmlns:a="http://schemas.openxmlformats.org/drawingml/2006/main" xmlns:r="http://schemas.openxmlformats.org/officeDocument/2006/relationships" xmlns:p="http://schemas.openxmlformats.org/presentationml/2006/main">
+  <p:cSld>
+    <p:bg>
+      <p:bgPr>
+        <a:solidFill>
+          <a:schemeClr val="bg1"/>
+        </a:solidFill>
+        <a:effectLst/>
+      </p:bgPr>
+    </p:bg>
+    <p:spTree>
+      <p:nvGrpSpPr>
+        <p:cNvPr id="1" name=""/>
+        <p:cNvGrpSpPr/>
+        <p:nvPr/>
+      </p:nvGrpSpPr>
+      <p:grpSpPr>
+        <a:xfrm>
+          <a:off x="0" y="0"/>
+          <a:ext cx="0" cy="0"/>
+          <a:chOff x="0" y="0"/>
+          <a:chExt cx="0" cy="0"/>
+        </a:xfrm>
+      </p:grpSpPr>
+      <p:sp>
+        <p:nvSpPr>
+          <p:cNvPr id="2" name="Title 1">
+            <a:extLst>
+              <a:ext uri="{FF2B5EF4-FFF2-40B4-BE49-F238E27FC236}">
+                <a16:creationId xmlns:a16="http://schemas.microsoft.com/office/drawing/2014/main" id="{E58E48C7-B280-43FB-AB65-6FA5B204BDFA}"/>
+              </a:ext>
+            </a:extLst>
+          </p:cNvPr>
+          <p:cNvSpPr>
+            <a:spLocks noGrp="1"/>
+          </p:cNvSpPr>
+          <p:nvPr>
+            <p:ph type="title"/>
+          </p:nvPr>
+        </p:nvSpPr>
+        <p:spPr>
+          <a:xfrm>
+            <a:off x="838200" y="365125"/>
+            <a:ext cx="10515600" cy="1325563"/>
+          </a:xfrm>
+        </p:spPr>
+        <p:txBody>
+          <a:bodyPr>
+            <a:normAutofit/>
+          </a:bodyPr>
+          <a:lstStyle/>
+          <a:p>
+            <a:r>
+              <a:rPr lang="en-US" dirty="0"/>
+              <a:t>Long Short-Term Memory (LSTM)</a:t>
+            </a:r>
+          </a:p>
+        </p:txBody>
+      </p:sp>
+      <p:sp>
+        <p:nvSpPr>
+          <p:cNvPr id="3" name="Content Placeholder 2">
+            <a:extLst>
+              <a:ext uri="{FF2B5EF4-FFF2-40B4-BE49-F238E27FC236}">
+                <a16:creationId xmlns:a16="http://schemas.microsoft.com/office/drawing/2014/main" id="{EB34166B-6718-4B27-9340-41111E7E5AAE}"/>
+              </a:ext>
+            </a:extLst>
+          </p:cNvPr>
+          <p:cNvSpPr>
+            <a:spLocks noGrp="1"/>
+          </p:cNvSpPr>
+          <p:nvPr>
+            <p:ph idx="1"/>
+          </p:nvPr>
+        </p:nvSpPr>
+        <p:spPr>
+          <a:xfrm>
+            <a:off x="838200" y="1825625"/>
+            <a:ext cx="3797807" cy="4351338"/>
+          </a:xfrm>
+        </p:spPr>
+        <p:txBody>
+          <a:bodyPr>
+            <a:normAutofit/>
+          </a:bodyPr>
+          <a:lstStyle/>
+          <a:p>
+            <a:r>
+              <a:rPr lang="en-US" sz="2400" dirty="0"/>
+              <a:t>A different RNN node architecture that allows for longer memory</a:t>
+            </a:r>
+          </a:p>
+          <a:p>
+            <a:r>
+              <a:rPr lang="en-US" sz="2400" dirty="0"/>
+              <a:t>Essential for long, dynamic input sequences</a:t>
+            </a:r>
+          </a:p>
+          <a:p>
+            <a:r>
+              <a:rPr lang="en-US" sz="2400" dirty="0"/>
+              <a:t>RNNs with LSTM are often called LSTM networks or LSTMs</a:t>
+            </a:r>
+          </a:p>
+        </p:txBody>
+      </p:sp>
+      <p:pic>
+        <p:nvPicPr>
+          <p:cNvPr id="2050" name="Picture 2" descr="https://upload.wikimedia.org/wikipedia/commons/thumb/3/3b/The_LSTM_cell.png/1920px-The_LSTM_cell.png">
+            <a:extLst>
+              <a:ext uri="{FF2B5EF4-FFF2-40B4-BE49-F238E27FC236}">
+                <a16:creationId xmlns:a16="http://schemas.microsoft.com/office/drawing/2014/main" id="{9BC69639-6FD3-4CDB-8ABD-9D7B0ECA0F43}"/>
+              </a:ext>
+            </a:extLst>
+          </p:cNvPr>
+          <p:cNvPicPr>
+            <a:picLocks noChangeAspect="1" noChangeArrowheads="1"/>
+          </p:cNvPicPr>
+          <p:nvPr/>
+        </p:nvPicPr>
+        <p:blipFill rotWithShape="1">
+          <a:blip r:embed="rId2">
+            <a:extLst>
+              <a:ext uri="{28A0092B-C50C-407E-A947-70E740481C1C}">
+                <a14:useLocalDpi xmlns:a14="http://schemas.microsoft.com/office/drawing/2010/main" val="0"/>
+              </a:ext>
+            </a:extLst>
+          </a:blip>
+          <a:srcRect r="4082"/>
+          <a:stretch/>
+        </p:blipFill>
+        <p:spPr bwMode="auto">
+          <a:xfrm>
+            <a:off x="5120640" y="1904281"/>
+            <a:ext cx="6233160" cy="4272681"/>
+          </a:xfrm>
+          <a:prstGeom prst="rect">
+            <a:avLst/>
+          </a:prstGeom>
+          <a:noFill/>
+          <a:extLst>
+            <a:ext uri="{909E8E84-426E-40DD-AFC4-6F175D3DCCD1}">
+              <a14:hiddenFill xmlns:a14="http://schemas.microsoft.com/office/drawing/2010/main">
+                <a:solidFill>
+                  <a:srgbClr val="FFFFFF"/>
+                </a:solidFill>
+              </a14:hiddenFill>
+            </a:ext>
+          </a:extLst>
+        </p:spPr>
+      </p:pic>
+      <p:sp>
+        <p:nvSpPr>
+          <p:cNvPr id="4" name="Slide Number Placeholder 3">
+            <a:extLst>
+              <a:ext uri="{FF2B5EF4-FFF2-40B4-BE49-F238E27FC236}">
+                <a16:creationId xmlns:a16="http://schemas.microsoft.com/office/drawing/2014/main" id="{737CDF6E-AB2E-433F-9B99-3987022A7EB7}"/>
+              </a:ext>
+            </a:extLst>
+          </p:cNvPr>
+          <p:cNvSpPr>
+            <a:spLocks noGrp="1"/>
+          </p:cNvSpPr>
+          <p:nvPr>
+            <p:ph type="sldNum" sz="quarter" idx="12"/>
+          </p:nvPr>
+        </p:nvSpPr>
+        <p:spPr>
+          <a:xfrm>
+            <a:off x="8610600" y="6356350"/>
+            <a:ext cx="2743200" cy="365125"/>
+          </a:xfrm>
+        </p:spPr>
+        <p:txBody>
+          <a:bodyPr>
+            <a:normAutofit/>
+          </a:bodyPr>
+          <a:lstStyle/>
+          <a:p>
+            <a:pPr>
+              <a:spcAft>
+                <a:spcPts val="600"/>
+              </a:spcAft>
+            </a:pPr>
+            <a:fld id="{5CD4DF6E-3AFD-46C7-AD8A-B62CB1DA2890}" type="slidenum">
+              <a:rPr lang="en-US" smtClean="0"/>
+              <a:pPr>
+                <a:spcAft>
+                  <a:spcPts val="600"/>
+                </a:spcAft>
+              </a:pPr>
+              <a:t>4</a:t>
+            </a:fld>
+            <a:endParaRPr lang="en-US"/>
+          </a:p>
+        </p:txBody>
+      </p:sp>
+    </p:spTree>
+    <p:extLst>
+      <p:ext uri="{BB962C8B-B14F-4D97-AF65-F5344CB8AC3E}">
+        <p14:creationId xmlns:p14="http://schemas.microsoft.com/office/powerpoint/2010/main" val="2454232969"/>
       </p:ext>
     </p:extLst>
   </p:cSld>
@@ -3813,7 +4558,7 @@
           <p:cNvPr id="2" name="Title 1">
             <a:extLst>
               <a:ext uri="{FF2B5EF4-FFF2-40B4-BE49-F238E27FC236}">
-                <a16:creationId xmlns:a16="http://schemas.microsoft.com/office/drawing/2014/main" id="{E7FCB9AD-FFC1-49FE-B4B7-E29E809BEE38}"/>
+                <a16:creationId xmlns:a16="http://schemas.microsoft.com/office/drawing/2014/main" id="{8F2D1812-ED00-477B-BE25-E90BF6B2C823}"/>
               </a:ext>
             </a:extLst>
           </p:cNvPr>
@@ -3831,7 +4576,7 @@
           <a:p>
             <a:r>
               <a:rPr lang="en-US" dirty="0"/>
-              <a:t>Implementation</a:t>
+              <a:t>RNN Perks</a:t>
             </a:r>
           </a:p>
         </p:txBody>
@@ -3841,7 +4586,7 @@
           <p:cNvPr id="3" name="Content Placeholder 2">
             <a:extLst>
               <a:ext uri="{FF2B5EF4-FFF2-40B4-BE49-F238E27FC236}">
-                <a16:creationId xmlns:a16="http://schemas.microsoft.com/office/drawing/2014/main" id="{0851F731-928F-449E-9295-EE9D224D3925}"/>
+                <a16:creationId xmlns:a16="http://schemas.microsoft.com/office/drawing/2014/main" id="{665BD318-427F-4538-B84D-733AC5FA9537}"/>
               </a:ext>
             </a:extLst>
           </p:cNvPr>
@@ -3859,40 +4604,85 @@
           <a:p>
             <a:r>
               <a:rPr lang="en-US" dirty="0"/>
-              <a:t>The RNN was created and trained in Python using </a:t>
-            </a:r>
-            <a:r>
-              <a:rPr lang="en-US" dirty="0" err="1"/>
-              <a:t>Keras</a:t>
-            </a:r>
-            <a:endParaRPr lang="en-US" dirty="0"/>
-          </a:p>
-          <a:p>
+              <a:t>RNNs can dynamically adapt to various types of noise</a:t>
+            </a:r>
+          </a:p>
+          <a:p>
+            <a:pPr lvl="1"/>
             <a:r>
               <a:rPr lang="en-US" dirty="0"/>
-              <a:t>After training, the model was translated into C</a:t>
+              <a:t>RNNs are well-suited for processing temporal data</a:t>
             </a:r>
           </a:p>
           <a:p>
             <a:pPr lvl="1"/>
             <a:r>
-              <a:rPr lang="en-US" dirty="0" err="1"/>
-              <a:t>Cython</a:t>
-            </a:r>
-            <a:endParaRPr lang="en-US" dirty="0"/>
-          </a:p>
-          <a:p>
-            <a:r>
               <a:rPr lang="en-US" dirty="0"/>
-              <a:t>Noise removal performed in C</a:t>
-            </a:r>
+              <a:t>Long short-term memory (LSTM) allows for processing of long sequences</a:t>
+            </a:r>
+          </a:p>
+          <a:p>
+            <a:r>
+              <a:rPr lang="en-US" dirty="0"/>
+              <a:t>Hardware requirements are extremely low and processing time is extremely short</a:t>
+            </a:r>
+          </a:p>
+          <a:p>
+            <a:pPr lvl="1"/>
+            <a:r>
+              <a:rPr lang="en-US" dirty="0"/>
+              <a:t>60x faster than real-time on an x86 CPU</a:t>
+            </a:r>
+          </a:p>
+          <a:p>
+            <a:pPr lvl="1"/>
+            <a:r>
+              <a:rPr lang="en-US" dirty="0"/>
+              <a:t>7x faster than real-time on a Raspberry Pi</a:t>
+            </a:r>
+          </a:p>
+          <a:p>
+            <a:pPr lvl="1"/>
+            <a:r>
+              <a:rPr lang="en-US" dirty="0"/>
+              <a:t>Can even be implemented in JavaScript and executed in your browser</a:t>
+            </a:r>
+          </a:p>
+        </p:txBody>
+      </p:sp>
+      <p:sp>
+        <p:nvSpPr>
+          <p:cNvPr id="4" name="Slide Number Placeholder 3">
+            <a:extLst>
+              <a:ext uri="{FF2B5EF4-FFF2-40B4-BE49-F238E27FC236}">
+                <a16:creationId xmlns:a16="http://schemas.microsoft.com/office/drawing/2014/main" id="{A15C2175-8715-444A-B2C1-E04090B91EAE}"/>
+              </a:ext>
+            </a:extLst>
+          </p:cNvPr>
+          <p:cNvSpPr>
+            <a:spLocks noGrp="1"/>
+          </p:cNvSpPr>
+          <p:nvPr>
+            <p:ph type="sldNum" sz="quarter" idx="12"/>
+          </p:nvPr>
+        </p:nvSpPr>
+        <p:spPr/>
+        <p:txBody>
+          <a:bodyPr/>
+          <a:lstStyle/>
+          <a:p>
+            <a:fld id="{5CD4DF6E-3AFD-46C7-AD8A-B62CB1DA2890}" type="slidenum">
+              <a:rPr lang="en-US" smtClean="0"/>
+              <a:t>5</a:t>
+            </a:fld>
+            <a:endParaRPr lang="en-US"/>
           </a:p>
         </p:txBody>
       </p:sp>
     </p:spTree>
     <p:extLst>
       <p:ext uri="{BB962C8B-B14F-4D97-AF65-F5344CB8AC3E}">
-        <p14:creationId xmlns:p14="http://schemas.microsoft.com/office/powerpoint/2010/main" val="211479631"/>
+        <p14:creationId xmlns:p14="http://schemas.microsoft.com/office/powerpoint/2010/main" val="2188919131"/>
       </p:ext>
     </p:extLst>
   </p:cSld>
@@ -3924,6 +4714,316 @@
           <p:cNvPr id="2" name="Title 1">
             <a:extLst>
               <a:ext uri="{FF2B5EF4-FFF2-40B4-BE49-F238E27FC236}">
+                <a16:creationId xmlns:a16="http://schemas.microsoft.com/office/drawing/2014/main" id="{31938827-1503-42E7-BD6C-5A9006C9D0F0}"/>
+              </a:ext>
+            </a:extLst>
+          </p:cNvPr>
+          <p:cNvSpPr>
+            <a:spLocks noGrp="1"/>
+          </p:cNvSpPr>
+          <p:nvPr>
+            <p:ph type="title"/>
+          </p:nvPr>
+        </p:nvSpPr>
+        <p:spPr/>
+        <p:txBody>
+          <a:bodyPr/>
+          <a:lstStyle/>
+          <a:p>
+            <a:r>
+              <a:rPr lang="en-US" dirty="0"/>
+              <a:t>How </a:t>
+            </a:r>
+            <a:r>
+              <a:rPr lang="en-US" dirty="0" err="1"/>
+              <a:t>RNNoise</a:t>
+            </a:r>
+            <a:r>
+              <a:rPr lang="en-US" dirty="0"/>
+              <a:t> Works</a:t>
+            </a:r>
+          </a:p>
+        </p:txBody>
+      </p:sp>
+      <p:sp>
+        <p:nvSpPr>
+          <p:cNvPr id="4" name="Content Placeholder 3">
+            <a:extLst>
+              <a:ext uri="{FF2B5EF4-FFF2-40B4-BE49-F238E27FC236}">
+                <a16:creationId xmlns:a16="http://schemas.microsoft.com/office/drawing/2014/main" id="{1E7AFC40-F86C-4C2B-B4DA-565282468C6A}"/>
+              </a:ext>
+            </a:extLst>
+          </p:cNvPr>
+          <p:cNvSpPr>
+            <a:spLocks noGrp="1"/>
+          </p:cNvSpPr>
+          <p:nvPr>
+            <p:ph idx="1"/>
+          </p:nvPr>
+        </p:nvSpPr>
+        <p:spPr/>
+        <p:txBody>
+          <a:bodyPr/>
+          <a:lstStyle/>
+          <a:p>
+            <a:r>
+              <a:rPr lang="en-US" dirty="0"/>
+              <a:t>RNN determines what part of audio should be removed</a:t>
+            </a:r>
+          </a:p>
+        </p:txBody>
+      </p:sp>
+      <p:pic>
+        <p:nvPicPr>
+          <p:cNvPr id="6" name="Picture 2" descr="traditional noise suppression">
+            <a:extLst>
+              <a:ext uri="{FF2B5EF4-FFF2-40B4-BE49-F238E27FC236}">
+                <a16:creationId xmlns:a16="http://schemas.microsoft.com/office/drawing/2014/main" id="{CAEBD616-67DE-4359-AAA8-045288A7E7B0}"/>
+              </a:ext>
+            </a:extLst>
+          </p:cNvPr>
+          <p:cNvPicPr>
+            <a:picLocks noChangeAspect="1" noChangeArrowheads="1"/>
+          </p:cNvPicPr>
+          <p:nvPr/>
+        </p:nvPicPr>
+        <p:blipFill>
+          <a:blip r:embed="rId2">
+            <a:extLst>
+              <a:ext uri="{28A0092B-C50C-407E-A947-70E740481C1C}">
+                <a14:useLocalDpi xmlns:a14="http://schemas.microsoft.com/office/drawing/2010/main" val="0"/>
+              </a:ext>
+            </a:extLst>
+          </a:blip>
+          <a:srcRect/>
+          <a:stretch>
+            <a:fillRect/>
+          </a:stretch>
+        </p:blipFill>
+        <p:spPr bwMode="auto">
+          <a:xfrm>
+            <a:off x="3002533" y="2259869"/>
+            <a:ext cx="6186933" cy="3917094"/>
+          </a:xfrm>
+          <a:prstGeom prst="rect">
+            <a:avLst/>
+          </a:prstGeom>
+          <a:noFill/>
+          <a:extLst>
+            <a:ext uri="{909E8E84-426E-40DD-AFC4-6F175D3DCCD1}">
+              <a14:hiddenFill xmlns:a14="http://schemas.microsoft.com/office/drawing/2010/main">
+                <a:solidFill>
+                  <a:srgbClr val="FFFFFF"/>
+                </a:solidFill>
+              </a14:hiddenFill>
+            </a:ext>
+          </a:extLst>
+        </p:spPr>
+      </p:pic>
+      <p:sp>
+        <p:nvSpPr>
+          <p:cNvPr id="3" name="Slide Number Placeholder 2">
+            <a:extLst>
+              <a:ext uri="{FF2B5EF4-FFF2-40B4-BE49-F238E27FC236}">
+                <a16:creationId xmlns:a16="http://schemas.microsoft.com/office/drawing/2014/main" id="{33254CBB-A3F8-4146-91FE-2AFEFA0200A4}"/>
+              </a:ext>
+            </a:extLst>
+          </p:cNvPr>
+          <p:cNvSpPr>
+            <a:spLocks noGrp="1"/>
+          </p:cNvSpPr>
+          <p:nvPr>
+            <p:ph type="sldNum" sz="quarter" idx="12"/>
+          </p:nvPr>
+        </p:nvSpPr>
+        <p:spPr/>
+        <p:txBody>
+          <a:bodyPr/>
+          <a:lstStyle/>
+          <a:p>
+            <a:fld id="{5CD4DF6E-3AFD-46C7-AD8A-B62CB1DA2890}" type="slidenum">
+              <a:rPr lang="en-US" smtClean="0"/>
+              <a:t>6</a:t>
+            </a:fld>
+            <a:endParaRPr lang="en-US"/>
+          </a:p>
+        </p:txBody>
+      </p:sp>
+    </p:spTree>
+    <p:extLst>
+      <p:ext uri="{BB962C8B-B14F-4D97-AF65-F5344CB8AC3E}">
+        <p14:creationId xmlns:p14="http://schemas.microsoft.com/office/powerpoint/2010/main" val="1288499024"/>
+      </p:ext>
+    </p:extLst>
+  </p:cSld>
+  <p:clrMapOvr>
+    <a:masterClrMapping/>
+  </p:clrMapOvr>
+</p:sld>
+</file>
+
+<file path=ppt/slides/slide7.xml><?xml version="1.0" encoding="utf-8"?>
+<p:sld xmlns:a="http://schemas.openxmlformats.org/drawingml/2006/main" xmlns:r="http://schemas.openxmlformats.org/officeDocument/2006/relationships" xmlns:p="http://schemas.openxmlformats.org/presentationml/2006/main">
+  <p:cSld>
+    <p:spTree>
+      <p:nvGrpSpPr>
+        <p:cNvPr id="1" name=""/>
+        <p:cNvGrpSpPr/>
+        <p:nvPr/>
+      </p:nvGrpSpPr>
+      <p:grpSpPr>
+        <a:xfrm>
+          <a:off x="0" y="0"/>
+          <a:ext cx="0" cy="0"/>
+          <a:chOff x="0" y="0"/>
+          <a:chExt cx="0" cy="0"/>
+        </a:xfrm>
+      </p:grpSpPr>
+      <p:sp>
+        <p:nvSpPr>
+          <p:cNvPr id="2" name="Title 1">
+            <a:extLst>
+              <a:ext uri="{FF2B5EF4-FFF2-40B4-BE49-F238E27FC236}">
+                <a16:creationId xmlns:a16="http://schemas.microsoft.com/office/drawing/2014/main" id="{E7FCB9AD-FFC1-49FE-B4B7-E29E809BEE38}"/>
+              </a:ext>
+            </a:extLst>
+          </p:cNvPr>
+          <p:cNvSpPr>
+            <a:spLocks noGrp="1"/>
+          </p:cNvSpPr>
+          <p:nvPr>
+            <p:ph type="title"/>
+          </p:nvPr>
+        </p:nvSpPr>
+        <p:spPr/>
+        <p:txBody>
+          <a:bodyPr/>
+          <a:lstStyle/>
+          <a:p>
+            <a:r>
+              <a:rPr lang="en-US" dirty="0"/>
+              <a:t>Implementation</a:t>
+            </a:r>
+          </a:p>
+        </p:txBody>
+      </p:sp>
+      <p:sp>
+        <p:nvSpPr>
+          <p:cNvPr id="3" name="Content Placeholder 2">
+            <a:extLst>
+              <a:ext uri="{FF2B5EF4-FFF2-40B4-BE49-F238E27FC236}">
+                <a16:creationId xmlns:a16="http://schemas.microsoft.com/office/drawing/2014/main" id="{0851F731-928F-449E-9295-EE9D224D3925}"/>
+              </a:ext>
+            </a:extLst>
+          </p:cNvPr>
+          <p:cNvSpPr>
+            <a:spLocks noGrp="1"/>
+          </p:cNvSpPr>
+          <p:nvPr>
+            <p:ph idx="1"/>
+          </p:nvPr>
+        </p:nvSpPr>
+        <p:spPr/>
+        <p:txBody>
+          <a:bodyPr/>
+          <a:lstStyle/>
+          <a:p>
+            <a:r>
+              <a:rPr lang="en-US" dirty="0"/>
+              <a:t>The RNN was created and trained in Python using </a:t>
+            </a:r>
+            <a:r>
+              <a:rPr lang="en-US" dirty="0" err="1"/>
+              <a:t>Keras</a:t>
+            </a:r>
+            <a:endParaRPr lang="en-US" dirty="0"/>
+          </a:p>
+          <a:p>
+            <a:r>
+              <a:rPr lang="en-US" dirty="0"/>
+              <a:t>After training, the model was translated into C</a:t>
+            </a:r>
+          </a:p>
+          <a:p>
+            <a:pPr lvl="1"/>
+            <a:r>
+              <a:rPr lang="en-US" dirty="0" err="1"/>
+              <a:t>Cython</a:t>
+            </a:r>
+            <a:endParaRPr lang="en-US" dirty="0"/>
+          </a:p>
+          <a:p>
+            <a:r>
+              <a:rPr lang="en-US" dirty="0"/>
+              <a:t>Noise removal performed in C</a:t>
+            </a:r>
+          </a:p>
+        </p:txBody>
+      </p:sp>
+      <p:sp>
+        <p:nvSpPr>
+          <p:cNvPr id="4" name="Slide Number Placeholder 3">
+            <a:extLst>
+              <a:ext uri="{FF2B5EF4-FFF2-40B4-BE49-F238E27FC236}">
+                <a16:creationId xmlns:a16="http://schemas.microsoft.com/office/drawing/2014/main" id="{7BB7618A-7BD6-4150-9037-3F3984E9D34A}"/>
+              </a:ext>
+            </a:extLst>
+          </p:cNvPr>
+          <p:cNvSpPr>
+            <a:spLocks noGrp="1"/>
+          </p:cNvSpPr>
+          <p:nvPr>
+            <p:ph type="sldNum" sz="quarter" idx="12"/>
+          </p:nvPr>
+        </p:nvSpPr>
+        <p:spPr/>
+        <p:txBody>
+          <a:bodyPr/>
+          <a:lstStyle/>
+          <a:p>
+            <a:fld id="{5CD4DF6E-3AFD-46C7-AD8A-B62CB1DA2890}" type="slidenum">
+              <a:rPr lang="en-US" smtClean="0"/>
+              <a:t>7</a:t>
+            </a:fld>
+            <a:endParaRPr lang="en-US"/>
+          </a:p>
+        </p:txBody>
+      </p:sp>
+    </p:spTree>
+    <p:extLst>
+      <p:ext uri="{BB962C8B-B14F-4D97-AF65-F5344CB8AC3E}">
+        <p14:creationId xmlns:p14="http://schemas.microsoft.com/office/powerpoint/2010/main" val="211479631"/>
+      </p:ext>
+    </p:extLst>
+  </p:cSld>
+  <p:clrMapOvr>
+    <a:masterClrMapping/>
+  </p:clrMapOvr>
+</p:sld>
+</file>
+
+<file path=ppt/slides/slide8.xml><?xml version="1.0" encoding="utf-8"?>
+<p:sld xmlns:a="http://schemas.openxmlformats.org/drawingml/2006/main" xmlns:r="http://schemas.openxmlformats.org/officeDocument/2006/relationships" xmlns:p="http://schemas.openxmlformats.org/presentationml/2006/main">
+  <p:cSld>
+    <p:spTree>
+      <p:nvGrpSpPr>
+        <p:cNvPr id="1" name=""/>
+        <p:cNvGrpSpPr/>
+        <p:nvPr/>
+      </p:nvGrpSpPr>
+      <p:grpSpPr>
+        <a:xfrm>
+          <a:off x="0" y="0"/>
+          <a:ext cx="0" cy="0"/>
+          <a:chOff x="0" y="0"/>
+          <a:chExt cx="0" cy="0"/>
+        </a:xfrm>
+      </p:grpSpPr>
+      <p:sp>
+        <p:nvSpPr>
+          <p:cNvPr id="2" name="Title 1">
+            <a:extLst>
+              <a:ext uri="{FF2B5EF4-FFF2-40B4-BE49-F238E27FC236}">
                 <a16:creationId xmlns:a16="http://schemas.microsoft.com/office/drawing/2014/main" id="{06DDBA5A-EDC7-4E6C-9270-6BF868F5DC50}"/>
               </a:ext>
             </a:extLst>
@@ -4031,6 +5131,35 @@
           </a:p>
         </p:txBody>
       </p:sp>
+      <p:sp>
+        <p:nvSpPr>
+          <p:cNvPr id="3" name="Slide Number Placeholder 2">
+            <a:extLst>
+              <a:ext uri="{FF2B5EF4-FFF2-40B4-BE49-F238E27FC236}">
+                <a16:creationId xmlns:a16="http://schemas.microsoft.com/office/drawing/2014/main" id="{5C0CF3A0-4109-4435-87ED-BF6DBD7F0E63}"/>
+              </a:ext>
+            </a:extLst>
+          </p:cNvPr>
+          <p:cNvSpPr>
+            <a:spLocks noGrp="1"/>
+          </p:cNvSpPr>
+          <p:nvPr>
+            <p:ph type="sldNum" sz="quarter" idx="12"/>
+          </p:nvPr>
+        </p:nvSpPr>
+        <p:spPr/>
+        <p:txBody>
+          <a:bodyPr/>
+          <a:lstStyle/>
+          <a:p>
+            <a:fld id="{5CD4DF6E-3AFD-46C7-AD8A-B62CB1DA2890}" type="slidenum">
+              <a:rPr lang="en-US" smtClean="0"/>
+              <a:t>8</a:t>
+            </a:fld>
+            <a:endParaRPr lang="en-US"/>
+          </a:p>
+        </p:txBody>
+      </p:sp>
     </p:spTree>
     <p:extLst>
       <p:ext uri="{BB962C8B-B14F-4D97-AF65-F5344CB8AC3E}">
@@ -4044,7 +5173,7 @@
 </p:sld>
 </file>
 
-<file path=ppt/slides/slide7.xml><?xml version="1.0" encoding="utf-8"?>
+<file path=ppt/slides/slide9.xml><?xml version="1.0" encoding="utf-8"?>
 <p:sld xmlns:a="http://schemas.openxmlformats.org/drawingml/2006/main" xmlns:r="http://schemas.openxmlformats.org/officeDocument/2006/relationships" xmlns:p="http://schemas.openxmlformats.org/presentationml/2006/main">
   <p:cSld>
     <p:spTree>
@@ -4173,117 +5302,39 @@
           </a:p>
         </p:txBody>
       </p:sp>
+      <p:sp>
+        <p:nvSpPr>
+          <p:cNvPr id="3" name="Slide Number Placeholder 2">
+            <a:extLst>
+              <a:ext uri="{FF2B5EF4-FFF2-40B4-BE49-F238E27FC236}">
+                <a16:creationId xmlns:a16="http://schemas.microsoft.com/office/drawing/2014/main" id="{60D78E3A-A7C9-498A-A4A1-BD7ED2927619}"/>
+              </a:ext>
+            </a:extLst>
+          </p:cNvPr>
+          <p:cNvSpPr>
+            <a:spLocks noGrp="1"/>
+          </p:cNvSpPr>
+          <p:nvPr>
+            <p:ph type="sldNum" sz="quarter" idx="12"/>
+          </p:nvPr>
+        </p:nvSpPr>
+        <p:spPr/>
+        <p:txBody>
+          <a:bodyPr/>
+          <a:lstStyle/>
+          <a:p>
+            <a:fld id="{5CD4DF6E-3AFD-46C7-AD8A-B62CB1DA2890}" type="slidenum">
+              <a:rPr lang="en-US" smtClean="0"/>
+              <a:t>9</a:t>
+            </a:fld>
+            <a:endParaRPr lang="en-US"/>
+          </a:p>
+        </p:txBody>
+      </p:sp>
     </p:spTree>
     <p:extLst>
       <p:ext uri="{BB962C8B-B14F-4D97-AF65-F5344CB8AC3E}">
         <p14:creationId xmlns:p14="http://schemas.microsoft.com/office/powerpoint/2010/main" val="3090694236"/>
-      </p:ext>
-    </p:extLst>
-  </p:cSld>
-  <p:clrMapOvr>
-    <a:masterClrMapping/>
-  </p:clrMapOvr>
-</p:sld>
-</file>
-
-<file path=ppt/slides/slide8.xml><?xml version="1.0" encoding="utf-8"?>
-<p:sld xmlns:a="http://schemas.openxmlformats.org/drawingml/2006/main" xmlns:r="http://schemas.openxmlformats.org/officeDocument/2006/relationships" xmlns:p="http://schemas.openxmlformats.org/presentationml/2006/main">
-  <p:cSld>
-    <p:spTree>
-      <p:nvGrpSpPr>
-        <p:cNvPr id="1" name=""/>
-        <p:cNvGrpSpPr/>
-        <p:nvPr/>
-      </p:nvGrpSpPr>
-      <p:grpSpPr>
-        <a:xfrm>
-          <a:off x="0" y="0"/>
-          <a:ext cx="0" cy="0"/>
-          <a:chOff x="0" y="0"/>
-          <a:chExt cx="0" cy="0"/>
-        </a:xfrm>
-      </p:grpSpPr>
-      <p:sp>
-        <p:nvSpPr>
-          <p:cNvPr id="2" name="Title 1">
-            <a:extLst>
-              <a:ext uri="{FF2B5EF4-FFF2-40B4-BE49-F238E27FC236}">
-                <a16:creationId xmlns:a16="http://schemas.microsoft.com/office/drawing/2014/main" id="{B1A96B1E-6167-4EF5-B7A2-EF942F67CDEF}"/>
-              </a:ext>
-            </a:extLst>
-          </p:cNvPr>
-          <p:cNvSpPr>
-            <a:spLocks noGrp="1"/>
-          </p:cNvSpPr>
-          <p:nvPr>
-            <p:ph type="title"/>
-          </p:nvPr>
-        </p:nvSpPr>
-        <p:spPr/>
-        <p:txBody>
-          <a:bodyPr/>
-          <a:lstStyle/>
-          <a:p>
-            <a:r>
-              <a:rPr lang="en-US" dirty="0"/>
-              <a:t>Resources</a:t>
-            </a:r>
-          </a:p>
-        </p:txBody>
-      </p:sp>
-      <p:sp>
-        <p:nvSpPr>
-          <p:cNvPr id="3" name="Content Placeholder 2">
-            <a:extLst>
-              <a:ext uri="{FF2B5EF4-FFF2-40B4-BE49-F238E27FC236}">
-                <a16:creationId xmlns:a16="http://schemas.microsoft.com/office/drawing/2014/main" id="{E2E023F1-D434-4328-90D1-6E0E6F443958}"/>
-              </a:ext>
-            </a:extLst>
-          </p:cNvPr>
-          <p:cNvSpPr>
-            <a:spLocks noGrp="1"/>
-          </p:cNvSpPr>
-          <p:nvPr>
-            <p:ph idx="1"/>
-          </p:nvPr>
-        </p:nvSpPr>
-        <p:spPr/>
-        <p:txBody>
-          <a:bodyPr/>
-          <a:lstStyle/>
-          <a:p>
-            <a:r>
-              <a:rPr lang="en-US" dirty="0">
-                <a:hlinkClick r:id="rId2"/>
-              </a:rPr>
-              <a:t>https://people.xiph.org/~jm/demo/rnnoise/</a:t>
-            </a:r>
-            <a:endParaRPr lang="en-US" dirty="0"/>
-          </a:p>
-          <a:p>
-            <a:r>
-              <a:rPr lang="en-US" dirty="0">
-                <a:hlinkClick r:id="rId3"/>
-              </a:rPr>
-              <a:t>https://hacks.mozilla.org/2017/09/rnnoise-deep-learning-noise-suppression/</a:t>
-            </a:r>
-            <a:endParaRPr lang="en-US" dirty="0"/>
-          </a:p>
-          <a:p>
-            <a:r>
-              <a:rPr lang="en-US" dirty="0">
-                <a:hlinkClick r:id="rId4"/>
-              </a:rPr>
-              <a:t>https://en.wikipedia.org/wiki/Recurrent_neural_network</a:t>
-            </a:r>
-            <a:endParaRPr lang="en-US" dirty="0"/>
-          </a:p>
-        </p:txBody>
-      </p:sp>
-    </p:spTree>
-    <p:extLst>
-      <p:ext uri="{BB962C8B-B14F-4D97-AF65-F5344CB8AC3E}">
-        <p14:creationId xmlns:p14="http://schemas.microsoft.com/office/powerpoint/2010/main" val="572103786"/>
       </p:ext>
     </p:extLst>
   </p:cSld>
@@ -4586,4 +5637,299 @@
     </a:ext>
   </a:extLst>
 </a:theme>
+</file>
+
+<file path=ppt/theme/theme2.xml><?xml version="1.0" encoding="utf-8"?>
+<a:theme xmlns:a="http://schemas.openxmlformats.org/drawingml/2006/main" name="Office Theme">
+  <a:themeElements>
+    <a:clrScheme name="Office">
+      <a:dk1>
+        <a:sysClr val="windowText" lastClr="000000"/>
+      </a:dk1>
+      <a:lt1>
+        <a:sysClr val="window" lastClr="FFFFFF"/>
+      </a:lt1>
+      <a:dk2>
+        <a:srgbClr val="44546A"/>
+      </a:dk2>
+      <a:lt2>
+        <a:srgbClr val="E7E6E6"/>
+      </a:lt2>
+      <a:accent1>
+        <a:srgbClr val="4472C4"/>
+      </a:accent1>
+      <a:accent2>
+        <a:srgbClr val="ED7D31"/>
+      </a:accent2>
+      <a:accent3>
+        <a:srgbClr val="A5A5A5"/>
+      </a:accent3>
+      <a:accent4>
+        <a:srgbClr val="FFC000"/>
+      </a:accent4>
+      <a:accent5>
+        <a:srgbClr val="5B9BD5"/>
+      </a:accent5>
+      <a:accent6>
+        <a:srgbClr val="70AD47"/>
+      </a:accent6>
+      <a:hlink>
+        <a:srgbClr val="0563C1"/>
+      </a:hlink>
+      <a:folHlink>
+        <a:srgbClr val="954F72"/>
+      </a:folHlink>
+    </a:clrScheme>
+    <a:fontScheme name="Office">
+      <a:majorFont>
+        <a:latin typeface="Calibri Light" panose="020F0302020204030204"/>
+        <a:ea typeface=""/>
+        <a:cs typeface=""/>
+        <a:font script="Jpan" typeface="游ゴシック Light"/>
+        <a:font script="Hang" typeface="맑은 고딕"/>
+        <a:font script="Hans" typeface="等线 Light"/>
+        <a:font script="Hant" typeface="新細明體"/>
+        <a:font script="Arab" typeface="Times New Roman"/>
+        <a:font script="Hebr" typeface="Times New Roman"/>
+        <a:font script="Thai" typeface="Angsana New"/>
+        <a:font script="Ethi" typeface="Nyala"/>
+        <a:font script="Beng" typeface="Vrinda"/>
+        <a:font script="Gujr" typeface="Shruti"/>
+        <a:font script="Khmr" typeface="MoolBoran"/>
+        <a:font script="Knda" typeface="Tunga"/>
+        <a:font script="Guru" typeface="Raavi"/>
+        <a:font script="Cans" typeface="Euphemia"/>
+        <a:font script="Cher" typeface="Plantagenet Cherokee"/>
+        <a:font script="Yiii" typeface="Microsoft Yi Baiti"/>
+        <a:font script="Tibt" typeface="Microsoft Himalaya"/>
+        <a:font script="Thaa" typeface="MV Boli"/>
+        <a:font script="Deva" typeface="Mangal"/>
+        <a:font script="Telu" typeface="Gautami"/>
+        <a:font script="Taml" typeface="Latha"/>
+        <a:font script="Syrc" typeface="Estrangelo Edessa"/>
+        <a:font script="Orya" typeface="Kalinga"/>
+        <a:font script="Mlym" typeface="Kartika"/>
+        <a:font script="Laoo" typeface="DokChampa"/>
+        <a:font script="Sinh" typeface="Iskoola Pota"/>
+        <a:font script="Mong" typeface="Mongolian Baiti"/>
+        <a:font script="Viet" typeface="Times New Roman"/>
+        <a:font script="Uigh" typeface="Microsoft Uighur"/>
+        <a:font script="Geor" typeface="Sylfaen"/>
+        <a:font script="Armn" typeface="Arial"/>
+        <a:font script="Bugi" typeface="Leelawadee UI"/>
+        <a:font script="Bopo" typeface="Microsoft JhengHei"/>
+        <a:font script="Java" typeface="Javanese Text"/>
+        <a:font script="Lisu" typeface="Segoe UI"/>
+        <a:font script="Mymr" typeface="Myanmar Text"/>
+        <a:font script="Nkoo" typeface="Ebrima"/>
+        <a:font script="Olck" typeface="Nirmala UI"/>
+        <a:font script="Osma" typeface="Ebrima"/>
+        <a:font script="Phag" typeface="Phagspa"/>
+        <a:font script="Syrn" typeface="Estrangelo Edessa"/>
+        <a:font script="Syrj" typeface="Estrangelo Edessa"/>
+        <a:font script="Syre" typeface="Estrangelo Edessa"/>
+        <a:font script="Sora" typeface="Nirmala UI"/>
+        <a:font script="Tale" typeface="Microsoft Tai Le"/>
+        <a:font script="Talu" typeface="Microsoft New Tai Lue"/>
+        <a:font script="Tfng" typeface="Ebrima"/>
+      </a:majorFont>
+      <a:minorFont>
+        <a:latin typeface="Calibri" panose="020F0502020204030204"/>
+        <a:ea typeface=""/>
+        <a:cs typeface=""/>
+        <a:font script="Jpan" typeface="游ゴシック"/>
+        <a:font script="Hang" typeface="맑은 고딕"/>
+        <a:font script="Hans" typeface="等线"/>
+        <a:font script="Hant" typeface="新細明體"/>
+        <a:font script="Arab" typeface="Arial"/>
+        <a:font script="Hebr" typeface="Arial"/>
+        <a:font script="Thai" typeface="Cordia New"/>
+        <a:font script="Ethi" typeface="Nyala"/>
+        <a:font script="Beng" typeface="Vrinda"/>
+        <a:font script="Gujr" typeface="Shruti"/>
+        <a:font script="Khmr" typeface="DaunPenh"/>
+        <a:font script="Knda" typeface="Tunga"/>
+        <a:font script="Guru" typeface="Raavi"/>
+        <a:font script="Cans" typeface="Euphemia"/>
+        <a:font script="Cher" typeface="Plantagenet Cherokee"/>
+        <a:font script="Yiii" typeface="Microsoft Yi Baiti"/>
+        <a:font script="Tibt" typeface="Microsoft Himalaya"/>
+        <a:font script="Thaa" typeface="MV Boli"/>
+        <a:font script="Deva" typeface="Mangal"/>
+        <a:font script="Telu" typeface="Gautami"/>
+        <a:font script="Taml" typeface="Latha"/>
+        <a:font script="Syrc" typeface="Estrangelo Edessa"/>
+        <a:font script="Orya" typeface="Kalinga"/>
+        <a:font script="Mlym" typeface="Kartika"/>
+        <a:font script="Laoo" typeface="DokChampa"/>
+        <a:font script="Sinh" typeface="Iskoola Pota"/>
+        <a:font script="Mong" typeface="Mongolian Baiti"/>
+        <a:font script="Viet" typeface="Arial"/>
+        <a:font script="Uigh" typeface="Microsoft Uighur"/>
+        <a:font script="Geor" typeface="Sylfaen"/>
+        <a:font script="Armn" typeface="Arial"/>
+        <a:font script="Bugi" typeface="Leelawadee UI"/>
+        <a:font script="Bopo" typeface="Microsoft JhengHei"/>
+        <a:font script="Java" typeface="Javanese Text"/>
+        <a:font script="Lisu" typeface="Segoe UI"/>
+        <a:font script="Mymr" typeface="Myanmar Text"/>
+        <a:font script="Nkoo" typeface="Ebrima"/>
+        <a:font script="Olck" typeface="Nirmala UI"/>
+        <a:font script="Osma" typeface="Ebrima"/>
+        <a:font script="Phag" typeface="Phagspa"/>
+        <a:font script="Syrn" typeface="Estrangelo Edessa"/>
+        <a:font script="Syrj" typeface="Estrangelo Edessa"/>
+        <a:font script="Syre" typeface="Estrangelo Edessa"/>
+        <a:font script="Sora" typeface="Nirmala UI"/>
+        <a:font script="Tale" typeface="Microsoft Tai Le"/>
+        <a:font script="Talu" typeface="Microsoft New Tai Lue"/>
+        <a:font script="Tfng" typeface="Ebrima"/>
+      </a:minorFont>
+    </a:fontScheme>
+    <a:fmtScheme name="Office">
+      <a:fillStyleLst>
+        <a:solidFill>
+          <a:schemeClr val="phClr"/>
+        </a:solidFill>
+        <a:gradFill rotWithShape="1">
+          <a:gsLst>
+            <a:gs pos="0">
+              <a:schemeClr val="phClr">
+                <a:lumMod val="110000"/>
+                <a:satMod val="105000"/>
+                <a:tint val="67000"/>
+              </a:schemeClr>
+            </a:gs>
+            <a:gs pos="50000">
+              <a:schemeClr val="phClr">
+                <a:lumMod val="105000"/>
+                <a:satMod val="103000"/>
+                <a:tint val="73000"/>
+              </a:schemeClr>
+            </a:gs>
+            <a:gs pos="100000">
+              <a:schemeClr val="phClr">
+                <a:lumMod val="105000"/>
+                <a:satMod val="109000"/>
+                <a:tint val="81000"/>
+              </a:schemeClr>
+            </a:gs>
+          </a:gsLst>
+          <a:lin ang="5400000" scaled="0"/>
+        </a:gradFill>
+        <a:gradFill rotWithShape="1">
+          <a:gsLst>
+            <a:gs pos="0">
+              <a:schemeClr val="phClr">
+                <a:satMod val="103000"/>
+                <a:lumMod val="102000"/>
+                <a:tint val="94000"/>
+              </a:schemeClr>
+            </a:gs>
+            <a:gs pos="50000">
+              <a:schemeClr val="phClr">
+                <a:satMod val="110000"/>
+                <a:lumMod val="100000"/>
+                <a:shade val="100000"/>
+              </a:schemeClr>
+            </a:gs>
+            <a:gs pos="100000">
+              <a:schemeClr val="phClr">
+                <a:lumMod val="99000"/>
+                <a:satMod val="120000"/>
+                <a:shade val="78000"/>
+              </a:schemeClr>
+            </a:gs>
+          </a:gsLst>
+          <a:lin ang="5400000" scaled="0"/>
+        </a:gradFill>
+      </a:fillStyleLst>
+      <a:lnStyleLst>
+        <a:ln w="6350" cap="flat" cmpd="sng" algn="ctr">
+          <a:solidFill>
+            <a:schemeClr val="phClr"/>
+          </a:solidFill>
+          <a:prstDash val="solid"/>
+          <a:miter lim="800000"/>
+        </a:ln>
+        <a:ln w="12700" cap="flat" cmpd="sng" algn="ctr">
+          <a:solidFill>
+            <a:schemeClr val="phClr"/>
+          </a:solidFill>
+          <a:prstDash val="solid"/>
+          <a:miter lim="800000"/>
+        </a:ln>
+        <a:ln w="19050" cap="flat" cmpd="sng" algn="ctr">
+          <a:solidFill>
+            <a:schemeClr val="phClr"/>
+          </a:solidFill>
+          <a:prstDash val="solid"/>
+          <a:miter lim="800000"/>
+        </a:ln>
+      </a:lnStyleLst>
+      <a:effectStyleLst>
+        <a:effectStyle>
+          <a:effectLst/>
+        </a:effectStyle>
+        <a:effectStyle>
+          <a:effectLst/>
+        </a:effectStyle>
+        <a:effectStyle>
+          <a:effectLst>
+            <a:outerShdw blurRad="57150" dist="19050" dir="5400000" algn="ctr" rotWithShape="0">
+              <a:srgbClr val="000000">
+                <a:alpha val="63000"/>
+              </a:srgbClr>
+            </a:outerShdw>
+          </a:effectLst>
+        </a:effectStyle>
+      </a:effectStyleLst>
+      <a:bgFillStyleLst>
+        <a:solidFill>
+          <a:schemeClr val="phClr"/>
+        </a:solidFill>
+        <a:solidFill>
+          <a:schemeClr val="phClr">
+            <a:tint val="95000"/>
+            <a:satMod val="170000"/>
+          </a:schemeClr>
+        </a:solidFill>
+        <a:gradFill rotWithShape="1">
+          <a:gsLst>
+            <a:gs pos="0">
+              <a:schemeClr val="phClr">
+                <a:tint val="93000"/>
+                <a:satMod val="150000"/>
+                <a:shade val="98000"/>
+                <a:lumMod val="102000"/>
+              </a:schemeClr>
+            </a:gs>
+            <a:gs pos="50000">
+              <a:schemeClr val="phClr">
+                <a:tint val="98000"/>
+                <a:satMod val="130000"/>
+                <a:shade val="90000"/>
+                <a:lumMod val="103000"/>
+              </a:schemeClr>
+            </a:gs>
+            <a:gs pos="100000">
+              <a:schemeClr val="phClr">
+                <a:shade val="63000"/>
+                <a:satMod val="120000"/>
+              </a:schemeClr>
+            </a:gs>
+          </a:gsLst>
+          <a:lin ang="5400000" scaled="0"/>
+        </a:gradFill>
+      </a:bgFillStyleLst>
+    </a:fmtScheme>
+  </a:themeElements>
+  <a:objectDefaults/>
+  <a:extraClrSchemeLst/>
+  <a:extLst>
+    <a:ext uri="{05A4C25C-085E-4340-85A3-A5531E510DB2}">
+      <thm15:themeFamily xmlns:thm15="http://schemas.microsoft.com/office/thememl/2012/main" name="Office Theme" id="{62F939B6-93AF-4DB8-9C6B-D6C7DFDC589F}" vid="{4A3C46E8-61CC-4603-A589-7422A47A8E4A}"/>
+    </a:ext>
+  </a:extLst>
+</a:theme>
 </file>
</xml_diff>